<commit_message>
Guidline 4 in progress
</commit_message>
<xml_diff>
--- a/ppt/Introduction_to_Disability_and_AT.pptx
+++ b/ppt/Introduction_to_Disability_and_AT.pptx
@@ -241,7 +241,7 @@
             <a:fld id="{D83FDC75-7F73-4A4A-A77C-09AADF00E0EA}" type="datetimeFigureOut">
               <a:rPr lang="en-US" smtClean="0"/>
               <a:pPr/>
-              <a:t>11/16/2013</a:t>
+              <a:t>11/19/2013</a:t>
             </a:fld>
             <a:endParaRPr lang="en-US" dirty="0"/>
           </a:p>
@@ -408,7 +408,7 @@
             <a:fld id="{48AEF76B-3757-4A0B-AF93-28494465C1DD}" type="datetimeFigureOut">
               <a:rPr lang="en-US" smtClean="0"/>
               <a:pPr/>
-              <a:t>11/16/2013</a:t>
+              <a:t>11/19/2013</a:t>
             </a:fld>
             <a:endParaRPr lang="en-US" dirty="0"/>
           </a:p>
@@ -2161,7 +2161,7 @@
             <a:fld id="{757B281C-5159-4971-8228-52B9A72E9ED2}" type="datetimeFigureOut">
               <a:rPr lang="en-US" smtClean="0"/>
               <a:pPr/>
-              <a:t>11/16/2013</a:t>
+              <a:t>11/19/2013</a:t>
             </a:fld>
             <a:endParaRPr lang="en-US" dirty="0"/>
           </a:p>
@@ -2263,7 +2263,7 @@
             <a:fld id="{757B281C-5159-4971-8228-52B9A72E9ED2}" type="datetimeFigureOut">
               <a:rPr lang="en-US" smtClean="0"/>
               <a:pPr/>
-              <a:t>11/16/2013</a:t>
+              <a:t>11/19/2013</a:t>
             </a:fld>
             <a:endParaRPr lang="en-US" dirty="0"/>
           </a:p>
@@ -2399,7 +2399,7 @@
             <a:fld id="{757B281C-5159-4971-8228-52B9A72E9ED2}" type="datetimeFigureOut">
               <a:rPr lang="en-US" smtClean="0"/>
               <a:pPr/>
-              <a:t>11/16/2013</a:t>
+              <a:t>11/19/2013</a:t>
             </a:fld>
             <a:endParaRPr lang="en-US" dirty="0"/>
           </a:p>
@@ -2605,7 +2605,7 @@
             <a:fld id="{757B281C-5159-4971-8228-52B9A72E9ED2}" type="datetimeFigureOut">
               <a:rPr lang="en-US" smtClean="0"/>
               <a:pPr/>
-              <a:t>11/16/2013</a:t>
+              <a:t>11/19/2013</a:t>
             </a:fld>
             <a:endParaRPr lang="en-US" dirty="0"/>
           </a:p>
@@ -3004,7 +3004,7 @@
             <a:fld id="{757B281C-5159-4971-8228-52B9A72E9ED2}" type="datetimeFigureOut">
               <a:rPr lang="en-US" smtClean="0"/>
               <a:pPr/>
-              <a:t>11/16/2013</a:t>
+              <a:t>11/19/2013</a:t>
             </a:fld>
             <a:endParaRPr lang="en-US" dirty="0"/>
           </a:p>
@@ -3304,7 +3304,7 @@
             <a:fld id="{757B281C-5159-4971-8228-52B9A72E9ED2}" type="datetimeFigureOut">
               <a:rPr lang="en-US" smtClean="0"/>
               <a:pPr/>
-              <a:t>11/16/2013</a:t>
+              <a:t>11/19/2013</a:t>
             </a:fld>
             <a:endParaRPr lang="en-US" dirty="0"/>
           </a:p>
@@ -3733,7 +3733,7 @@
             <a:fld id="{757B281C-5159-4971-8228-52B9A72E9ED2}" type="datetimeFigureOut">
               <a:rPr lang="en-US" smtClean="0"/>
               <a:pPr/>
-              <a:t>11/16/2013</a:t>
+              <a:t>11/19/2013</a:t>
             </a:fld>
             <a:endParaRPr lang="en-US" dirty="0"/>
           </a:p>
@@ -4010,7 +4010,7 @@
             <a:fld id="{757B281C-5159-4971-8228-52B9A72E9ED2}" type="datetimeFigureOut">
               <a:rPr lang="en-US" smtClean="0"/>
               <a:pPr/>
-              <a:t>11/16/2013</a:t>
+              <a:t>11/19/2013</a:t>
             </a:fld>
             <a:endParaRPr lang="en-US" dirty="0"/>
           </a:p>
@@ -4274,7 +4274,7 @@
             <a:fld id="{757B281C-5159-4971-8228-52B9A72E9ED2}" type="datetimeFigureOut">
               <a:rPr lang="en-US" smtClean="0"/>
               <a:pPr/>
-              <a:t>11/16/2013</a:t>
+              <a:t>11/19/2013</a:t>
             </a:fld>
             <a:endParaRPr lang="en-US" dirty="0"/>
           </a:p>
@@ -4444,7 +4444,7 @@
             <a:fld id="{757B281C-5159-4971-8228-52B9A72E9ED2}" type="datetimeFigureOut">
               <a:rPr lang="en-US" smtClean="0"/>
               <a:pPr/>
-              <a:t>11/16/2013</a:t>
+              <a:t>11/19/2013</a:t>
             </a:fld>
             <a:endParaRPr lang="en-US" dirty="0"/>
           </a:p>
@@ -4624,7 +4624,7 @@
             <a:fld id="{757B281C-5159-4971-8228-52B9A72E9ED2}" type="datetimeFigureOut">
               <a:rPr lang="en-US" smtClean="0"/>
               <a:pPr/>
-              <a:t>11/16/2013</a:t>
+              <a:t>11/19/2013</a:t>
             </a:fld>
             <a:endParaRPr lang="en-US" dirty="0"/>
           </a:p>
@@ -4866,7 +4866,7 @@
             <a:fld id="{757B281C-5159-4971-8228-52B9A72E9ED2}" type="datetimeFigureOut">
               <a:rPr lang="en-US" smtClean="0"/>
               <a:pPr/>
-              <a:t>11/16/2013</a:t>
+              <a:t>11/19/2013</a:t>
             </a:fld>
             <a:endParaRPr lang="en-US" dirty="0"/>
           </a:p>
@@ -5340,9 +5340,6 @@
               </a:rPr>
               <a:t>accessible.org</a:t>
             </a:r>
-            <a:endParaRPr lang="en-US" sz="2400" dirty="0" smtClean="0">
-              <a:latin typeface="+mn-lt"/>
-            </a:endParaRPr>
           </a:p>
           <a:p>
             <a:r>
@@ -6051,137 +6048,6 @@
           </a:graphicData>
         </a:graphic>
       </p:graphicFrame>
-      <p:sp>
-        <p:nvSpPr>
-          <p:cNvPr id="3" name="Rectangle 1"/>
-          <p:cNvSpPr>
-            <a:spLocks noChangeArrowheads="1"/>
-          </p:cNvSpPr>
-          <p:nvPr/>
-        </p:nvSpPr>
-        <p:spPr bwMode="auto">
-          <a:xfrm>
-            <a:off x="0" y="0"/>
-            <a:ext cx="9144000" cy="457200"/>
-          </a:xfrm>
-          <a:prstGeom prst="rect">
-            <a:avLst/>
-          </a:prstGeom>
-          <a:noFill/>
-          <a:ln>
-            <a:noFill/>
-          </a:ln>
-          <a:effectLst/>
-          <a:extLst>
-            <a:ext uri="{909E8E84-426E-40DD-AFC4-6F175D3DCCD1}">
-              <a14:hiddenFill xmlns:a14="http://schemas.microsoft.com/office/drawing/2010/main">
-                <a:solidFill>
-                  <a:schemeClr val="accent1"/>
-                </a:solidFill>
-              </a14:hiddenFill>
-            </a:ext>
-            <a:ext uri="{91240B29-F687-4F45-9708-019B960494DF}">
-              <a14:hiddenLine xmlns:a14="http://schemas.microsoft.com/office/drawing/2010/main" w="9525">
-                <a:solidFill>
-                  <a:schemeClr val="tx1"/>
-                </a:solidFill>
-                <a:miter lim="800000"/>
-                <a:headEnd/>
-                <a:tailEnd/>
-              </a14:hiddenLine>
-            </a:ext>
-            <a:ext uri="{AF507438-7753-43E0-B8FC-AC1667EBCBE1}">
-              <a14:hiddenEffects xmlns:a14="http://schemas.microsoft.com/office/drawing/2010/main">
-                <a:effectLst>
-                  <a:outerShdw dist="35921" dir="2700000" algn="ctr" rotWithShape="0">
-                    <a:schemeClr val="bg2"/>
-                  </a:outerShdw>
-                </a:effectLst>
-              </a14:hiddenEffects>
-            </a:ext>
-          </a:extLst>
-        </p:spPr>
-        <p:txBody>
-          <a:bodyPr vert="horz" wrap="none" lIns="91440" tIns="45720" rIns="91440" bIns="45720" numCol="1" anchor="ctr" anchorCtr="0" compatLnSpc="1">
-            <a:prstTxWarp prst="textNoShape">
-              <a:avLst/>
-            </a:prstTxWarp>
-            <a:spAutoFit/>
-          </a:bodyPr>
-          <a:lstStyle/>
-          <a:p>
-            <a:pPr marL="0" marR="0" lvl="0" indent="0" algn="l" defTabSz="914400" rtl="0" eaLnBrk="1" fontAlgn="base" latinLnBrk="0" hangingPunct="1">
-              <a:lnSpc>
-                <a:spcPct val="100000"/>
-              </a:lnSpc>
-              <a:spcBef>
-                <a:spcPct val="0"/>
-              </a:spcBef>
-              <a:spcAft>
-                <a:spcPct val="0"/>
-              </a:spcAft>
-              <a:buClrTx/>
-              <a:buSzTx/>
-              <a:buFontTx/>
-              <a:buNone/>
-              <a:tabLst/>
-            </a:pPr>
-            <a:r>
-              <a:rPr kumimoji="0" lang="en-US" sz="900" b="0" i="0" u="none" strike="noStrike" cap="none" normalizeH="0" baseline="0" smtClean="0">
-                <a:ln>
-                  <a:noFill/>
-                </a:ln>
-                <a:solidFill>
-                  <a:schemeClr val="tx1"/>
-                </a:solidFill>
-                <a:effectLst/>
-                <a:latin typeface="Courier New" pitchFamily="49" charset="0"/>
-                <a:cs typeface="Courier New" pitchFamily="49" charset="0"/>
-              </a:rPr>
-              <a:t>Cache-Control : max-age = </a:t>
-            </a:r>
-            <a:r>
-              <a:rPr kumimoji="0" lang="en-US" sz="1000" b="0" i="1" u="none" strike="noStrike" cap="none" normalizeH="0" baseline="0" smtClean="0">
-                <a:ln>
-                  <a:noFill/>
-                </a:ln>
-                <a:solidFill>
-                  <a:srgbClr val="FF0000"/>
-                </a:solidFill>
-                <a:effectLst/>
-                <a:latin typeface="Arial Unicode MS" pitchFamily="34" charset="-128"/>
-                <a:cs typeface="Courier New" pitchFamily="49" charset="0"/>
-              </a:rPr>
-              <a:t>seconds</a:t>
-            </a:r>
-            <a:r>
-              <a:rPr kumimoji="0" lang="en-US" sz="1100" b="0" i="0" u="none" strike="noStrike" cap="none" normalizeH="0" baseline="0" smtClean="0">
-                <a:ln>
-                  <a:noFill/>
-                </a:ln>
-                <a:solidFill>
-                  <a:schemeClr val="tx1"/>
-                </a:solidFill>
-                <a:effectLst/>
-                <a:latin typeface="Arial" pitchFamily="34" charset="0"/>
-                <a:cs typeface="Arial" pitchFamily="34" charset="0"/>
-              </a:rPr>
-              <a:t> </a:t>
-            </a:r>
-            <a:endParaRPr kumimoji="0" lang="en-US" sz="1800" b="0" i="0" u="none" strike="noStrike" cap="none" normalizeH="0" baseline="0" smtClean="0">
-              <a:ln>
-                <a:noFill/>
-              </a:ln>
-              <a:solidFill>
-                <a:schemeClr val="tx1"/>
-              </a:solidFill>
-              <a:effectLst/>
-              <a:latin typeface="Arial" pitchFamily="34" charset="0"/>
-              <a:cs typeface="Arial" pitchFamily="34" charset="0"/>
-            </a:endParaRPr>
-          </a:p>
-        </p:txBody>
-      </p:sp>
     </p:spTree>
     <p:custDataLst>
       <p:tags r:id="rId1"/>

</xml_diff>